<commit_message>
PWC 395047 units 1-9 run on 2/1/25
</commit_message>
<xml_diff>
--- a/user guide.pptx
+++ b/user guide.pptx
@@ -6,6 +6,8 @@
   </p:sldMasterIdLst>
   <p:sldIdLst>
     <p:sldId id="256" r:id="rId2"/>
+    <p:sldId id="257" r:id="rId3"/>
+    <p:sldId id="258" r:id="rId4"/>
   </p:sldIdLst>
   <p:sldSz cx="12192000" cy="6858000"/>
   <p:notesSz cx="6858000" cy="9144000"/>
@@ -104,6 +106,11 @@
       </a:defRPr>
     </a:lvl9pPr>
   </p:defaultTextStyle>
+  <p:extLst>
+    <p:ext uri="{EFAFB233-063F-42B5-8137-9DF3F51BA10A}">
+      <p15:sldGuideLst xmlns:p15="http://schemas.microsoft.com/office/powerpoint/2012/main"/>
+    </p:ext>
+  </p:extLst>
 </p:presentation>
 </file>
 
@@ -254,7 +261,7 @@
           <a:p>
             <a:fld id="{09F6CE2C-7CDB-4C89-98EE-AA0833614287}" type="datetimeFigureOut">
               <a:rPr lang="en-US" smtClean="0"/>
-              <a:t>1/28/2025</a:t>
+              <a:t>1/31/2025</a:t>
             </a:fld>
             <a:endParaRPr lang="en-US"/>
           </a:p>
@@ -452,7 +459,7 @@
           <a:p>
             <a:fld id="{09F6CE2C-7CDB-4C89-98EE-AA0833614287}" type="datetimeFigureOut">
               <a:rPr lang="en-US" smtClean="0"/>
-              <a:t>1/28/2025</a:t>
+              <a:t>1/31/2025</a:t>
             </a:fld>
             <a:endParaRPr lang="en-US"/>
           </a:p>
@@ -660,7 +667,7 @@
           <a:p>
             <a:fld id="{09F6CE2C-7CDB-4C89-98EE-AA0833614287}" type="datetimeFigureOut">
               <a:rPr lang="en-US" smtClean="0"/>
-              <a:t>1/28/2025</a:t>
+              <a:t>1/31/2025</a:t>
             </a:fld>
             <a:endParaRPr lang="en-US"/>
           </a:p>
@@ -858,7 +865,7 @@
           <a:p>
             <a:fld id="{09F6CE2C-7CDB-4C89-98EE-AA0833614287}" type="datetimeFigureOut">
               <a:rPr lang="en-US" smtClean="0"/>
-              <a:t>1/28/2025</a:t>
+              <a:t>1/31/2025</a:t>
             </a:fld>
             <a:endParaRPr lang="en-US"/>
           </a:p>
@@ -1133,7 +1140,7 @@
           <a:p>
             <a:fld id="{09F6CE2C-7CDB-4C89-98EE-AA0833614287}" type="datetimeFigureOut">
               <a:rPr lang="en-US" smtClean="0"/>
-              <a:t>1/28/2025</a:t>
+              <a:t>1/31/2025</a:t>
             </a:fld>
             <a:endParaRPr lang="en-US"/>
           </a:p>
@@ -1398,7 +1405,7 @@
           <a:p>
             <a:fld id="{09F6CE2C-7CDB-4C89-98EE-AA0833614287}" type="datetimeFigureOut">
               <a:rPr lang="en-US" smtClean="0"/>
-              <a:t>1/28/2025</a:t>
+              <a:t>1/31/2025</a:t>
             </a:fld>
             <a:endParaRPr lang="en-US"/>
           </a:p>
@@ -1810,7 +1817,7 @@
           <a:p>
             <a:fld id="{09F6CE2C-7CDB-4C89-98EE-AA0833614287}" type="datetimeFigureOut">
               <a:rPr lang="en-US" smtClean="0"/>
-              <a:t>1/28/2025</a:t>
+              <a:t>1/31/2025</a:t>
             </a:fld>
             <a:endParaRPr lang="en-US"/>
           </a:p>
@@ -1951,7 +1958,7 @@
           <a:p>
             <a:fld id="{09F6CE2C-7CDB-4C89-98EE-AA0833614287}" type="datetimeFigureOut">
               <a:rPr lang="en-US" smtClean="0"/>
-              <a:t>1/28/2025</a:t>
+              <a:t>1/31/2025</a:t>
             </a:fld>
             <a:endParaRPr lang="en-US"/>
           </a:p>
@@ -2064,7 +2071,7 @@
           <a:p>
             <a:fld id="{09F6CE2C-7CDB-4C89-98EE-AA0833614287}" type="datetimeFigureOut">
               <a:rPr lang="en-US" smtClean="0"/>
-              <a:t>1/28/2025</a:t>
+              <a:t>1/31/2025</a:t>
             </a:fld>
             <a:endParaRPr lang="en-US"/>
           </a:p>
@@ -2375,7 +2382,7 @@
           <a:p>
             <a:fld id="{09F6CE2C-7CDB-4C89-98EE-AA0833614287}" type="datetimeFigureOut">
               <a:rPr lang="en-US" smtClean="0"/>
-              <a:t>1/28/2025</a:t>
+              <a:t>1/31/2025</a:t>
             </a:fld>
             <a:endParaRPr lang="en-US"/>
           </a:p>
@@ -2663,7 +2670,7 @@
           <a:p>
             <a:fld id="{09F6CE2C-7CDB-4C89-98EE-AA0833614287}" type="datetimeFigureOut">
               <a:rPr lang="en-US" smtClean="0"/>
-              <a:t>1/28/2025</a:t>
+              <a:t>1/31/2025</a:t>
             </a:fld>
             <a:endParaRPr lang="en-US"/>
           </a:p>
@@ -2904,7 +2911,7 @@
           <a:p>
             <a:fld id="{09F6CE2C-7CDB-4C89-98EE-AA0833614287}" type="datetimeFigureOut">
               <a:rPr lang="en-US" smtClean="0"/>
-              <a:t>1/28/2025</a:t>
+              <a:t>1/31/2025</a:t>
             </a:fld>
             <a:endParaRPr lang="en-US"/>
           </a:p>
@@ -3449,6 +3456,242 @@
 </p:sld>
 </file>
 
+<file path=ppt/slides/slide2.xml><?xml version="1.0" encoding="utf-8"?>
+<p:sld xmlns:a="http://schemas.openxmlformats.org/drawingml/2006/main" xmlns:r="http://schemas.openxmlformats.org/officeDocument/2006/relationships" xmlns:p="http://schemas.openxmlformats.org/presentationml/2006/main">
+  <p:cSld>
+    <p:spTree>
+      <p:nvGrpSpPr>
+        <p:cNvPr id="1" name=""/>
+        <p:cNvGrpSpPr/>
+        <p:nvPr/>
+      </p:nvGrpSpPr>
+      <p:grpSpPr>
+        <a:xfrm>
+          <a:off x="0" y="0"/>
+          <a:ext cx="0" cy="0"/>
+          <a:chOff x="0" y="0"/>
+          <a:chExt cx="0" cy="0"/>
+        </a:xfrm>
+      </p:grpSpPr>
+      <p:sp>
+        <p:nvSpPr>
+          <p:cNvPr id="2" name="Title 1">
+            <a:extLst>
+              <a:ext uri="{FF2B5EF4-FFF2-40B4-BE49-F238E27FC236}">
+                <a16:creationId xmlns:a16="http://schemas.microsoft.com/office/drawing/2014/main" id="{FCA01F70-6ABA-A832-3BA2-ABB09706B073}"/>
+              </a:ext>
+            </a:extLst>
+          </p:cNvPr>
+          <p:cNvSpPr>
+            <a:spLocks noGrp="1"/>
+          </p:cNvSpPr>
+          <p:nvPr>
+            <p:ph type="title"/>
+          </p:nvPr>
+        </p:nvSpPr>
+        <p:spPr/>
+        <p:txBody>
+          <a:bodyPr/>
+          <a:lstStyle/>
+          <a:p>
+            <a:r>
+              <a:rPr lang="en-US" dirty="0" err="1"/>
+              <a:t>Pololu</a:t>
+            </a:r>
+            <a:r>
+              <a:rPr lang="en-US" dirty="0"/>
+              <a:t> MC18V7</a:t>
+            </a:r>
+          </a:p>
+        </p:txBody>
+      </p:sp>
+      <p:sp>
+        <p:nvSpPr>
+          <p:cNvPr id="3" name="Content Placeholder 2">
+            <a:extLst>
+              <a:ext uri="{FF2B5EF4-FFF2-40B4-BE49-F238E27FC236}">
+                <a16:creationId xmlns:a16="http://schemas.microsoft.com/office/drawing/2014/main" id="{BD320DB1-0487-9DAB-EE21-2E1D02C6A411}"/>
+              </a:ext>
+            </a:extLst>
+          </p:cNvPr>
+          <p:cNvSpPr>
+            <a:spLocks noGrp="1"/>
+          </p:cNvSpPr>
+          <p:nvPr>
+            <p:ph idx="1"/>
+          </p:nvPr>
+        </p:nvSpPr>
+        <p:spPr/>
+        <p:txBody>
+          <a:bodyPr>
+            <a:normAutofit fontScale="70000" lnSpcReduction="20000"/>
+          </a:bodyPr>
+          <a:lstStyle/>
+          <a:p>
+            <a:pPr marL="0" indent="0">
+              <a:buNone/>
+            </a:pPr>
+            <a:r>
+              <a:rPr lang="en-US" dirty="0" err="1"/>
+              <a:t>Nomimnal</a:t>
+            </a:r>
+            <a:r>
+              <a:rPr lang="en-US" dirty="0"/>
+              <a:t> 24 Vdc @ 7A  Vin Max is 30Vdc.  </a:t>
+            </a:r>
+          </a:p>
+          <a:p>
+            <a:pPr marL="0" indent="0">
+              <a:buNone/>
+            </a:pPr>
+            <a:r>
+              <a:rPr lang="en-US" dirty="0"/>
+              <a:t>After installing the drivers, if you go to your computer’s Device Manager and expand the “Ports (COM &amp; LPT)” list, you should see a COM port for the Simple Motor Controller. In parentheses after the name, you will see the name of the port (e.g. “COM5” or “COM6”). </a:t>
+            </a:r>
+          </a:p>
+          <a:p>
+            <a:pPr marL="0" indent="0">
+              <a:buNone/>
+            </a:pPr>
+            <a:r>
+              <a:rPr lang="en-US" dirty="0"/>
+              <a:t>You might see that the COM port is named “USB Serial Device” in the Device Manager instead of having a descriptive name. This can happen if you are using Windows 10 or later and you plugged the Simple Motor Controller into your computer before installing our drivers for it. In that case, Windows will set up your Simple Motor Controller using the default Windows serial driver (usbser.inf), and it will display “USB Serial Device” as the name for the port. The port will be usable, but it might be hard to distinguish the port from other ports because of the generic name shown in the Device Manager. We recommend fixing the name in the Device Manager by right-clicking on the “USB Serial Device” entry, selecting “Update Driver Software…”, and then selecting “Search automatically for updated driver software”. Windows should find the Simple Motor Controller drivers you already installed, which contain the correct name for the port. </a:t>
+            </a:r>
+          </a:p>
+          <a:p>
+            <a:pPr marL="0" indent="0">
+              <a:buNone/>
+            </a:pPr>
+            <a:r>
+              <a:rPr lang="en-US" dirty="0"/>
+              <a:t>If you want to change the COM port number assigned to your USB device, you can do so using the Device Manager. Bring up the properties dialog for the COM port and click the “Advanced…” button in the “Port Settings” tab. From this dialog you can change the COM port assigned to your device.</a:t>
+            </a:r>
+          </a:p>
+        </p:txBody>
+      </p:sp>
+    </p:spTree>
+    <p:extLst>
+      <p:ext uri="{BB962C8B-B14F-4D97-AF65-F5344CB8AC3E}">
+        <p14:creationId xmlns:p14="http://schemas.microsoft.com/office/powerpoint/2010/main" val="1213246165"/>
+      </p:ext>
+    </p:extLst>
+  </p:cSld>
+  <p:clrMapOvr>
+    <a:masterClrMapping/>
+  </p:clrMapOvr>
+</p:sld>
+</file>
+
+<file path=ppt/slides/slide3.xml><?xml version="1.0" encoding="utf-8"?>
+<p:sld xmlns:a="http://schemas.openxmlformats.org/drawingml/2006/main" xmlns:r="http://schemas.openxmlformats.org/officeDocument/2006/relationships" xmlns:p="http://schemas.openxmlformats.org/presentationml/2006/main">
+  <p:cSld>
+    <p:spTree>
+      <p:nvGrpSpPr>
+        <p:cNvPr id="1" name=""/>
+        <p:cNvGrpSpPr/>
+        <p:nvPr/>
+      </p:nvGrpSpPr>
+      <p:grpSpPr>
+        <a:xfrm>
+          <a:off x="0" y="0"/>
+          <a:ext cx="0" cy="0"/>
+          <a:chOff x="0" y="0"/>
+          <a:chExt cx="0" cy="0"/>
+        </a:xfrm>
+      </p:grpSpPr>
+      <p:pic>
+        <p:nvPicPr>
+          <p:cNvPr id="5" name="Picture 4">
+            <a:extLst>
+              <a:ext uri="{FF2B5EF4-FFF2-40B4-BE49-F238E27FC236}">
+                <a16:creationId xmlns:a16="http://schemas.microsoft.com/office/drawing/2014/main" id="{CD7F1EB6-F251-92C9-DC60-7FDFB3329015}"/>
+              </a:ext>
+            </a:extLst>
+          </p:cNvPr>
+          <p:cNvPicPr>
+            <a:picLocks noChangeAspect="1"/>
+          </p:cNvPicPr>
+          <p:nvPr/>
+        </p:nvPicPr>
+        <p:blipFill>
+          <a:blip r:embed="rId2"/>
+          <a:stretch>
+            <a:fillRect/>
+          </a:stretch>
+        </p:blipFill>
+        <p:spPr>
+          <a:xfrm>
+            <a:off x="2589758" y="882383"/>
+            <a:ext cx="6038780" cy="4900580"/>
+          </a:xfrm>
+          <a:prstGeom prst="rect">
+            <a:avLst/>
+          </a:prstGeom>
+        </p:spPr>
+      </p:pic>
+      <p:sp>
+        <p:nvSpPr>
+          <p:cNvPr id="2" name="Oval 1">
+            <a:extLst>
+              <a:ext uri="{FF2B5EF4-FFF2-40B4-BE49-F238E27FC236}">
+                <a16:creationId xmlns:a16="http://schemas.microsoft.com/office/drawing/2014/main" id="{8511629C-E759-3BC7-2EAF-BFD56481F81F}"/>
+              </a:ext>
+            </a:extLst>
+          </p:cNvPr>
+          <p:cNvSpPr/>
+          <p:nvPr/>
+        </p:nvSpPr>
+        <p:spPr>
+          <a:xfrm>
+            <a:off x="4514127" y="1898248"/>
+            <a:ext cx="1203767" cy="752355"/>
+          </a:xfrm>
+          <a:prstGeom prst="ellipse">
+            <a:avLst/>
+          </a:prstGeom>
+          <a:noFill/>
+          <a:ln w="38100">
+            <a:solidFill>
+              <a:srgbClr val="FF0000"/>
+            </a:solidFill>
+          </a:ln>
+        </p:spPr>
+        <p:style>
+          <a:lnRef idx="2">
+            <a:schemeClr val="accent6"/>
+          </a:lnRef>
+          <a:fillRef idx="1">
+            <a:schemeClr val="lt1"/>
+          </a:fillRef>
+          <a:effectRef idx="0">
+            <a:schemeClr val="accent6"/>
+          </a:effectRef>
+          <a:fontRef idx="minor">
+            <a:schemeClr val="dk1"/>
+          </a:fontRef>
+        </p:style>
+        <p:txBody>
+          <a:bodyPr rtlCol="0" anchor="ctr"/>
+          <a:lstStyle/>
+          <a:p>
+            <a:pPr algn="ctr"/>
+            <a:endParaRPr lang="en-US"/>
+          </a:p>
+        </p:txBody>
+      </p:sp>
+    </p:spTree>
+    <p:extLst>
+      <p:ext uri="{BB962C8B-B14F-4D97-AF65-F5344CB8AC3E}">
+        <p14:creationId xmlns:p14="http://schemas.microsoft.com/office/powerpoint/2010/main" val="3915195553"/>
+      </p:ext>
+    </p:extLst>
+  </p:cSld>
+  <p:clrMapOvr>
+    <a:masterClrMapping/>
+  </p:clrMapOvr>
+</p:sld>
+</file>
+
 <file path=ppt/theme/theme1.xml><?xml version="1.0" encoding="utf-8"?>
 <a:theme xmlns:a="http://schemas.openxmlformats.org/drawingml/2006/main" name="Office Theme">
   <a:themeElements>

</xml_diff>